<commit_message>
Update SIGMETRICS25 tutorial slides
</commit_message>
<xml_diff>
--- a/Tutorials/SIGMETRICS2025/sigmetrics25_tutorial_slides.pptx
+++ b/Tutorials/SIGMETRICS2025/sigmetrics25_tutorial_slides.pptx
@@ -5,7 +5,7 @@
     <p:sldMasterId id="2147483660" r:id="rId1"/>
   </p:sldMasterIdLst>
   <p:notesMasterIdLst>
-    <p:notesMasterId r:id="rId26"/>
+    <p:notesMasterId r:id="rId28"/>
   </p:notesMasterIdLst>
   <p:sldIdLst>
     <p:sldId id="280" r:id="rId2"/>
@@ -21,17 +21,19 @@
     <p:sldId id="1464" r:id="rId12"/>
     <p:sldId id="282" r:id="rId13"/>
     <p:sldId id="1485" r:id="rId14"/>
-    <p:sldId id="1484" r:id="rId15"/>
-    <p:sldId id="1487" r:id="rId16"/>
-    <p:sldId id="1475" r:id="rId17"/>
-    <p:sldId id="1465" r:id="rId18"/>
-    <p:sldId id="261" r:id="rId19"/>
-    <p:sldId id="1486" r:id="rId20"/>
-    <p:sldId id="1480" r:id="rId21"/>
-    <p:sldId id="1479" r:id="rId22"/>
-    <p:sldId id="1481" r:id="rId23"/>
-    <p:sldId id="1482" r:id="rId24"/>
-    <p:sldId id="1483" r:id="rId25"/>
+    <p:sldId id="1488" r:id="rId15"/>
+    <p:sldId id="1489" r:id="rId16"/>
+    <p:sldId id="1490" r:id="rId17"/>
+    <p:sldId id="1491" r:id="rId18"/>
+    <p:sldId id="1487" r:id="rId19"/>
+    <p:sldId id="1475" r:id="rId20"/>
+    <p:sldId id="1465" r:id="rId21"/>
+    <p:sldId id="261" r:id="rId22"/>
+    <p:sldId id="1480" r:id="rId23"/>
+    <p:sldId id="1479" r:id="rId24"/>
+    <p:sldId id="1481" r:id="rId25"/>
+    <p:sldId id="1482" r:id="rId26"/>
+    <p:sldId id="1483" r:id="rId27"/>
   </p:sldIdLst>
   <p:sldSz cx="12192000" cy="6858000"/>
   <p:notesSz cx="6858000" cy="9144000"/>
@@ -141,7 +143,7 @@
 <file path=ppt/revisionInfo.xml><?xml version="1.0" encoding="utf-8"?>
 <p1510:revInfo xmlns:a="http://schemas.openxmlformats.org/drawingml/2006/main" xmlns:r="http://schemas.openxmlformats.org/officeDocument/2006/relationships" xmlns:p1510="http://schemas.microsoft.com/office/powerpoint/2015/10/main">
   <p1510:revLst>
-    <p1510:client id="{82297FEC-3F26-4C1B-A293-EB5C0CF50AFE}" v="2" dt="2025-05-28T19:16:30.570"/>
+    <p1510:client id="{82297FEC-3F26-4C1B-A293-EB5C0CF50AFE}" v="7" dt="2025-06-06T19:50:27.574"/>
   </p1510:revLst>
 </p1510:revInfo>
 </file>
@@ -951,8 +953,8 @@
   </pc:docChgLst>
   <pc:docChgLst>
     <pc:chgData name="Li, Lingda" userId="f17e929f-4c6a-45ee-8991-f70a12fadfa4" providerId="ADAL" clId="{82297FEC-3F26-4C1B-A293-EB5C0CF50AFE}"/>
-    <pc:docChg chg="undo redo custSel addSld modSld sldOrd">
-      <pc:chgData name="Li, Lingda" userId="f17e929f-4c6a-45ee-8991-f70a12fadfa4" providerId="ADAL" clId="{82297FEC-3F26-4C1B-A293-EB5C0CF50AFE}" dt="2025-05-30T18:49:30.503" v="1671"/>
+    <pc:docChg chg="undo redo custSel addSld delSld modSld sldOrd">
+      <pc:chgData name="Li, Lingda" userId="f17e929f-4c6a-45ee-8991-f70a12fadfa4" providerId="ADAL" clId="{82297FEC-3F26-4C1B-A293-EB5C0CF50AFE}" dt="2025-06-06T19:50:37.665" v="2269" actId="20577"/>
       <pc:docMkLst>
         <pc:docMk/>
       </pc:docMkLst>
@@ -1179,7 +1181,7 @@
         </pc:picChg>
       </pc:sldChg>
       <pc:sldChg chg="addSp modSp new mod">
-        <pc:chgData name="Li, Lingda" userId="f17e929f-4c6a-45ee-8991-f70a12fadfa4" providerId="ADAL" clId="{82297FEC-3F26-4C1B-A293-EB5C0CF50AFE}" dt="2025-05-28T16:43:31.639" v="879" actId="20577"/>
+        <pc:chgData name="Li, Lingda" userId="f17e929f-4c6a-45ee-8991-f70a12fadfa4" providerId="ADAL" clId="{82297FEC-3F26-4C1B-A293-EB5C0CF50AFE}" dt="2025-06-06T16:03:02.332" v="2155" actId="20577"/>
         <pc:sldMkLst>
           <pc:docMk/>
           <pc:sldMk cId="3422353644" sldId="1482"/>
@@ -1190,6 +1192,14 @@
             <pc:docMk/>
             <pc:sldMk cId="3422353644" sldId="1482"/>
             <ac:spMk id="2" creationId="{3EF57B7E-45EF-BD42-B069-D4245222FCDB}"/>
+          </ac:spMkLst>
+        </pc:spChg>
+        <pc:spChg chg="mod">
+          <ac:chgData name="Li, Lingda" userId="f17e929f-4c6a-45ee-8991-f70a12fadfa4" providerId="ADAL" clId="{82297FEC-3F26-4C1B-A293-EB5C0CF50AFE}" dt="2025-06-06T16:03:02.332" v="2155" actId="20577"/>
+          <ac:spMkLst>
+            <pc:docMk/>
+            <pc:sldMk cId="3422353644" sldId="1482"/>
+            <ac:spMk id="3" creationId="{EAAE184D-74B7-5040-0E83-6A799103099C}"/>
           </ac:spMkLst>
         </pc:spChg>
         <pc:picChg chg="add mod">
@@ -1232,8 +1242,8 @@
           </ac:spMkLst>
         </pc:spChg>
       </pc:sldChg>
-      <pc:sldChg chg="new">
-        <pc:chgData name="Li, Lingda" userId="f17e929f-4c6a-45ee-8991-f70a12fadfa4" providerId="ADAL" clId="{82297FEC-3F26-4C1B-A293-EB5C0CF50AFE}" dt="2025-05-30T18:17:49.423" v="1576" actId="680"/>
+      <pc:sldChg chg="new del">
+        <pc:chgData name="Li, Lingda" userId="f17e929f-4c6a-45ee-8991-f70a12fadfa4" providerId="ADAL" clId="{82297FEC-3F26-4C1B-A293-EB5C0CF50AFE}" dt="2025-06-06T19:47:05.902" v="2157" actId="47"/>
         <pc:sldMkLst>
           <pc:docMk/>
           <pc:sldMk cId="573726497" sldId="1484"/>
@@ -1245,22 +1255,6 @@
           <pc:docMk/>
           <pc:sldMk cId="190345618" sldId="1485"/>
         </pc:sldMkLst>
-        <pc:spChg chg="del mod ord">
-          <ac:chgData name="Li, Lingda" userId="f17e929f-4c6a-45ee-8991-f70a12fadfa4" providerId="ADAL" clId="{82297FEC-3F26-4C1B-A293-EB5C0CF50AFE}" dt="2025-05-30T18:18:01.277" v="1578" actId="700"/>
-          <ac:spMkLst>
-            <pc:docMk/>
-            <pc:sldMk cId="190345618" sldId="1485"/>
-            <ac:spMk id="2" creationId="{86A05496-75B7-5342-F0FF-227113DA55D7}"/>
-          </ac:spMkLst>
-        </pc:spChg>
-        <pc:spChg chg="del mod ord">
-          <ac:chgData name="Li, Lingda" userId="f17e929f-4c6a-45ee-8991-f70a12fadfa4" providerId="ADAL" clId="{82297FEC-3F26-4C1B-A293-EB5C0CF50AFE}" dt="2025-05-30T18:18:01.277" v="1578" actId="700"/>
-          <ac:spMkLst>
-            <pc:docMk/>
-            <pc:sldMk cId="190345618" sldId="1485"/>
-            <ac:spMk id="3" creationId="{5BEE0573-0FFF-5C5B-4F63-8D6356DE9F22}"/>
-          </ac:spMkLst>
-        </pc:spChg>
         <pc:spChg chg="mod ord">
           <ac:chgData name="Li, Lingda" userId="f17e929f-4c6a-45ee-8991-f70a12fadfa4" providerId="ADAL" clId="{82297FEC-3F26-4C1B-A293-EB5C0CF50AFE}" dt="2025-05-30T18:18:01.277" v="1578" actId="700"/>
           <ac:spMkLst>
@@ -1286,8 +1280,8 @@
           </ac:spMkLst>
         </pc:spChg>
       </pc:sldChg>
-      <pc:sldChg chg="new">
-        <pc:chgData name="Li, Lingda" userId="f17e929f-4c6a-45ee-8991-f70a12fadfa4" providerId="ADAL" clId="{82297FEC-3F26-4C1B-A293-EB5C0CF50AFE}" dt="2025-05-30T18:49:04.660" v="1643" actId="680"/>
+      <pc:sldChg chg="new del">
+        <pc:chgData name="Li, Lingda" userId="f17e929f-4c6a-45ee-8991-f70a12fadfa4" providerId="ADAL" clId="{82297FEC-3F26-4C1B-A293-EB5C0CF50AFE}" dt="2025-06-06T19:48:30.748" v="2244" actId="47"/>
         <pc:sldMkLst>
           <pc:docMk/>
           <pc:sldMk cId="3620566448" sldId="1486"/>
@@ -1299,22 +1293,6 @@
           <pc:docMk/>
           <pc:sldMk cId="80177110" sldId="1487"/>
         </pc:sldMkLst>
-        <pc:spChg chg="del mod ord">
-          <ac:chgData name="Li, Lingda" userId="f17e929f-4c6a-45ee-8991-f70a12fadfa4" providerId="ADAL" clId="{82297FEC-3F26-4C1B-A293-EB5C0CF50AFE}" dt="2025-05-30T18:49:12.308" v="1645" actId="700"/>
-          <ac:spMkLst>
-            <pc:docMk/>
-            <pc:sldMk cId="80177110" sldId="1487"/>
-            <ac:spMk id="2" creationId="{E7EB3AFC-11FD-37F7-CAAA-19BC3E3B76DB}"/>
-          </ac:spMkLst>
-        </pc:spChg>
-        <pc:spChg chg="del mod ord">
-          <ac:chgData name="Li, Lingda" userId="f17e929f-4c6a-45ee-8991-f70a12fadfa4" providerId="ADAL" clId="{82297FEC-3F26-4C1B-A293-EB5C0CF50AFE}" dt="2025-05-30T18:49:12.308" v="1645" actId="700"/>
-          <ac:spMkLst>
-            <pc:docMk/>
-            <pc:sldMk cId="80177110" sldId="1487"/>
-            <ac:spMk id="3" creationId="{E401C50B-F2B6-330F-26A2-425000BA6F0E}"/>
-          </ac:spMkLst>
-        </pc:spChg>
         <pc:spChg chg="mod ord">
           <ac:chgData name="Li, Lingda" userId="f17e929f-4c6a-45ee-8991-f70a12fadfa4" providerId="ADAL" clId="{82297FEC-3F26-4C1B-A293-EB5C0CF50AFE}" dt="2025-05-30T18:49:12.308" v="1645" actId="700"/>
           <ac:spMkLst>
@@ -1337,6 +1315,58 @@
             <pc:docMk/>
             <pc:sldMk cId="80177110" sldId="1487"/>
             <ac:spMk id="6" creationId="{8C7AF401-3767-94D7-5B4E-EE09DB77D988}"/>
+          </ac:spMkLst>
+        </pc:spChg>
+      </pc:sldChg>
+      <pc:sldChg chg="modSp add mod">
+        <pc:chgData name="Li, Lingda" userId="f17e929f-4c6a-45ee-8991-f70a12fadfa4" providerId="ADAL" clId="{82297FEC-3F26-4C1B-A293-EB5C0CF50AFE}" dt="2025-06-06T19:48:23.106" v="2243" actId="20577"/>
+        <pc:sldMkLst>
+          <pc:docMk/>
+          <pc:sldMk cId="3041193778" sldId="1488"/>
+        </pc:sldMkLst>
+        <pc:spChg chg="mod">
+          <ac:chgData name="Li, Lingda" userId="f17e929f-4c6a-45ee-8991-f70a12fadfa4" providerId="ADAL" clId="{82297FEC-3F26-4C1B-A293-EB5C0CF50AFE}" dt="2025-06-06T19:48:23.106" v="2243" actId="20577"/>
+          <ac:spMkLst>
+            <pc:docMk/>
+            <pc:sldMk cId="3041193778" sldId="1488"/>
+            <ac:spMk id="3" creationId="{602F1C5E-F321-DAA1-CCF5-77DF5EC45C22}"/>
+          </ac:spMkLst>
+        </pc:spChg>
+      </pc:sldChg>
+      <pc:sldChg chg="add">
+        <pc:chgData name="Li, Lingda" userId="f17e929f-4c6a-45ee-8991-f70a12fadfa4" providerId="ADAL" clId="{82297FEC-3F26-4C1B-A293-EB5C0CF50AFE}" dt="2025-06-06T19:47:03.730" v="2156"/>
+        <pc:sldMkLst>
+          <pc:docMk/>
+          <pc:sldMk cId="2141560634" sldId="1489"/>
+        </pc:sldMkLst>
+      </pc:sldChg>
+      <pc:sldChg chg="add">
+        <pc:chgData name="Li, Lingda" userId="f17e929f-4c6a-45ee-8991-f70a12fadfa4" providerId="ADAL" clId="{82297FEC-3F26-4C1B-A293-EB5C0CF50AFE}" dt="2025-06-06T19:47:03.730" v="2156"/>
+        <pc:sldMkLst>
+          <pc:docMk/>
+          <pc:sldMk cId="1107933813" sldId="1490"/>
+        </pc:sldMkLst>
+      </pc:sldChg>
+      <pc:sldChg chg="modSp add mod">
+        <pc:chgData name="Li, Lingda" userId="f17e929f-4c6a-45ee-8991-f70a12fadfa4" providerId="ADAL" clId="{82297FEC-3F26-4C1B-A293-EB5C0CF50AFE}" dt="2025-06-06T19:50:37.665" v="2269" actId="20577"/>
+        <pc:sldMkLst>
+          <pc:docMk/>
+          <pc:sldMk cId="2986892675" sldId="1491"/>
+        </pc:sldMkLst>
+        <pc:spChg chg="mod">
+          <ac:chgData name="Li, Lingda" userId="f17e929f-4c6a-45ee-8991-f70a12fadfa4" providerId="ADAL" clId="{82297FEC-3F26-4C1B-A293-EB5C0CF50AFE}" dt="2025-06-06T19:48:18.404" v="2242" actId="20577"/>
+          <ac:spMkLst>
+            <pc:docMk/>
+            <pc:sldMk cId="2986892675" sldId="1491"/>
+            <ac:spMk id="2" creationId="{DF84E109-726A-44C3-29AF-83D99AC44C03}"/>
+          </ac:spMkLst>
+        </pc:spChg>
+        <pc:spChg chg="mod">
+          <ac:chgData name="Li, Lingda" userId="f17e929f-4c6a-45ee-8991-f70a12fadfa4" providerId="ADAL" clId="{82297FEC-3F26-4C1B-A293-EB5C0CF50AFE}" dt="2025-06-06T19:50:37.665" v="2269" actId="20577"/>
+          <ac:spMkLst>
+            <pc:docMk/>
+            <pc:sldMk cId="2986892675" sldId="1491"/>
+            <ac:spMk id="3" creationId="{2DC1BFFB-30CB-D98A-ED00-5638E5E12BB3}"/>
           </ac:spMkLst>
         </pc:spChg>
       </pc:sldChg>
@@ -1427,7 +1457,7 @@
           <a:p>
             <a:fld id="{2E36F475-F7F5-6C41-B37C-656C49194CAF}" type="datetimeFigureOut">
               <a:rPr lang="en-US" smtClean="0"/>
-              <a:t>5/30/2025</a:t>
+              <a:t>6/6/2025</a:t>
             </a:fld>
             <a:endParaRPr lang="en-US"/>
           </a:p>
@@ -1937,6 +1967,174 @@
     <p:extLst>
       <p:ext uri="{BB962C8B-B14F-4D97-AF65-F5344CB8AC3E}">
         <p14:creationId xmlns:p14="http://schemas.microsoft.com/office/powerpoint/2010/main" val="507693074"/>
+      </p:ext>
+    </p:extLst>
+  </p:cSld>
+  <p:clrMapOvr>
+    <a:masterClrMapping/>
+  </p:clrMapOvr>
+</p:notes>
+</file>
+
+<file path=ppt/notesSlides/notesSlide4.xml><?xml version="1.0" encoding="utf-8"?>
+<p:notes xmlns:a="http://schemas.openxmlformats.org/drawingml/2006/main" xmlns:r="http://schemas.openxmlformats.org/officeDocument/2006/relationships" xmlns:p="http://schemas.openxmlformats.org/presentationml/2006/main">
+  <p:cSld>
+    <p:spTree>
+      <p:nvGrpSpPr>
+        <p:cNvPr id="1" name=""/>
+        <p:cNvGrpSpPr/>
+        <p:nvPr/>
+      </p:nvGrpSpPr>
+      <p:grpSpPr>
+        <a:xfrm>
+          <a:off x="0" y="0"/>
+          <a:ext cx="0" cy="0"/>
+          <a:chOff x="0" y="0"/>
+          <a:chExt cx="0" cy="0"/>
+        </a:xfrm>
+      </p:grpSpPr>
+      <p:sp>
+        <p:nvSpPr>
+          <p:cNvPr id="2" name="Slide Image Placeholder 1"/>
+          <p:cNvSpPr>
+            <a:spLocks noGrp="1" noRot="1" noChangeAspect="1"/>
+          </p:cNvSpPr>
+          <p:nvPr>
+            <p:ph type="sldImg"/>
+          </p:nvPr>
+        </p:nvSpPr>
+        <p:spPr/>
+      </p:sp>
+      <p:sp>
+        <p:nvSpPr>
+          <p:cNvPr id="3" name="Notes Placeholder 2"/>
+          <p:cNvSpPr>
+            <a:spLocks noGrp="1"/>
+          </p:cNvSpPr>
+          <p:nvPr>
+            <p:ph type="body" idx="1"/>
+          </p:nvPr>
+        </p:nvSpPr>
+        <p:spPr/>
+        <p:txBody>
+          <a:bodyPr/>
+          <a:lstStyle/>
+          <a:p>
+            <a:endParaRPr lang="en-US" dirty="0"/>
+          </a:p>
+        </p:txBody>
+      </p:sp>
+      <p:sp>
+        <p:nvSpPr>
+          <p:cNvPr id="4" name="Slide Number Placeholder 3"/>
+          <p:cNvSpPr>
+            <a:spLocks noGrp="1"/>
+          </p:cNvSpPr>
+          <p:nvPr>
+            <p:ph type="sldNum" sz="quarter" idx="5"/>
+          </p:nvPr>
+        </p:nvSpPr>
+        <p:spPr/>
+        <p:txBody>
+          <a:bodyPr/>
+          <a:lstStyle/>
+          <a:p>
+            <a:fld id="{515839EF-EF2D-A244-8B03-02564FD38722}" type="slidenum">
+              <a:rPr lang="en-US" smtClean="0"/>
+              <a:t>16</a:t>
+            </a:fld>
+            <a:endParaRPr lang="en-US"/>
+          </a:p>
+        </p:txBody>
+      </p:sp>
+    </p:spTree>
+    <p:extLst>
+      <p:ext uri="{BB962C8B-B14F-4D97-AF65-F5344CB8AC3E}">
+        <p14:creationId xmlns:p14="http://schemas.microsoft.com/office/powerpoint/2010/main" val="1415185910"/>
+      </p:ext>
+    </p:extLst>
+  </p:cSld>
+  <p:clrMapOvr>
+    <a:masterClrMapping/>
+  </p:clrMapOvr>
+</p:notes>
+</file>
+
+<file path=ppt/notesSlides/notesSlide5.xml><?xml version="1.0" encoding="utf-8"?>
+<p:notes xmlns:a="http://schemas.openxmlformats.org/drawingml/2006/main" xmlns:r="http://schemas.openxmlformats.org/officeDocument/2006/relationships" xmlns:p="http://schemas.openxmlformats.org/presentationml/2006/main">
+  <p:cSld>
+    <p:spTree>
+      <p:nvGrpSpPr>
+        <p:cNvPr id="1" name=""/>
+        <p:cNvGrpSpPr/>
+        <p:nvPr/>
+      </p:nvGrpSpPr>
+      <p:grpSpPr>
+        <a:xfrm>
+          <a:off x="0" y="0"/>
+          <a:ext cx="0" cy="0"/>
+          <a:chOff x="0" y="0"/>
+          <a:chExt cx="0" cy="0"/>
+        </a:xfrm>
+      </p:grpSpPr>
+      <p:sp>
+        <p:nvSpPr>
+          <p:cNvPr id="2" name="Slide Image Placeholder 1"/>
+          <p:cNvSpPr>
+            <a:spLocks noGrp="1" noRot="1" noChangeAspect="1"/>
+          </p:cNvSpPr>
+          <p:nvPr>
+            <p:ph type="sldImg"/>
+          </p:nvPr>
+        </p:nvSpPr>
+        <p:spPr/>
+      </p:sp>
+      <p:sp>
+        <p:nvSpPr>
+          <p:cNvPr id="3" name="Notes Placeholder 2"/>
+          <p:cNvSpPr>
+            <a:spLocks noGrp="1"/>
+          </p:cNvSpPr>
+          <p:nvPr>
+            <p:ph type="body" idx="1"/>
+          </p:nvPr>
+        </p:nvSpPr>
+        <p:spPr/>
+        <p:txBody>
+          <a:bodyPr/>
+          <a:lstStyle/>
+          <a:p>
+            <a:endParaRPr lang="en-US" dirty="0"/>
+          </a:p>
+        </p:txBody>
+      </p:sp>
+      <p:sp>
+        <p:nvSpPr>
+          <p:cNvPr id="4" name="Slide Number Placeholder 3"/>
+          <p:cNvSpPr>
+            <a:spLocks noGrp="1"/>
+          </p:cNvSpPr>
+          <p:nvPr>
+            <p:ph type="sldNum" sz="quarter" idx="5"/>
+          </p:nvPr>
+        </p:nvSpPr>
+        <p:spPr/>
+        <p:txBody>
+          <a:bodyPr/>
+          <a:lstStyle/>
+          <a:p>
+            <a:fld id="{515839EF-EF2D-A244-8B03-02564FD38722}" type="slidenum">
+              <a:rPr lang="en-US" smtClean="0"/>
+              <a:t>17</a:t>
+            </a:fld>
+            <a:endParaRPr lang="en-US"/>
+          </a:p>
+        </p:txBody>
+      </p:sp>
+    </p:spTree>
+    <p:extLst>
+      <p:ext uri="{BB962C8B-B14F-4D97-AF65-F5344CB8AC3E}">
+        <p14:creationId xmlns:p14="http://schemas.microsoft.com/office/powerpoint/2010/main" val="3908298806"/>
       </p:ext>
     </p:extLst>
   </p:cSld>
@@ -6575,7 +6773,10 @@
           <a:bodyPr/>
           <a:lstStyle/>
           <a:p>
-            <a:endParaRPr lang="en-US"/>
+            <a:r>
+              <a:rPr lang="en-US" dirty="0"/>
+              <a:t>Agenda</a:t>
+            </a:r>
           </a:p>
         </p:txBody>
       </p:sp>
@@ -6600,7 +6801,22 @@
           <a:bodyPr/>
           <a:lstStyle/>
           <a:p>
-            <a:endParaRPr lang="en-US"/>
+            <a:r>
+              <a:rPr lang="en-US" dirty="0"/>
+              <a:t>Demo: cross-compile a program</a:t>
+            </a:r>
+          </a:p>
+          <a:p>
+            <a:r>
+              <a:rPr lang="en-US" dirty="0"/>
+              <a:t>Demo: gem5 simulation and trace generation</a:t>
+            </a:r>
+          </a:p>
+          <a:p>
+            <a:r>
+              <a:rPr lang="en-US" dirty="0"/>
+              <a:t>Hands-on: trace processing and prediction</a:t>
+            </a:r>
           </a:p>
         </p:txBody>
       </p:sp>
@@ -6637,7 +6853,7 @@
     </p:spTree>
     <p:extLst>
       <p:ext uri="{BB962C8B-B14F-4D97-AF65-F5344CB8AC3E}">
-        <p14:creationId xmlns:p14="http://schemas.microsoft.com/office/powerpoint/2010/main" val="573726497"/>
+        <p14:creationId xmlns:p14="http://schemas.microsoft.com/office/powerpoint/2010/main" val="3041193778"/>
       </p:ext>
     </p:extLst>
   </p:cSld>
@@ -6666,10 +6882,162 @@
       </p:grpSpPr>
       <p:sp>
         <p:nvSpPr>
+          <p:cNvPr id="2" name="Title 1">
+            <a:extLst>
+              <a:ext uri="{FF2B5EF4-FFF2-40B4-BE49-F238E27FC236}">
+                <a16:creationId xmlns:a16="http://schemas.microsoft.com/office/drawing/2014/main" id="{B1D5F721-DB48-FF04-9C22-CEF3D60DCF63}"/>
+              </a:ext>
+            </a:extLst>
+          </p:cNvPr>
+          <p:cNvSpPr>
+            <a:spLocks noGrp="1"/>
+          </p:cNvSpPr>
+          <p:nvPr>
+            <p:ph type="title"/>
+          </p:nvPr>
+        </p:nvSpPr>
+        <p:spPr/>
+        <p:txBody>
+          <a:bodyPr/>
+          <a:lstStyle/>
+          <a:p>
+            <a:r>
+              <a:rPr lang="en-US" dirty="0"/>
+              <a:t>Demo: Cross-compile a program</a:t>
+            </a:r>
+          </a:p>
+        </p:txBody>
+      </p:sp>
+      <p:sp>
+        <p:nvSpPr>
+          <p:cNvPr id="3" name="Content Placeholder 2">
+            <a:extLst>
+              <a:ext uri="{FF2B5EF4-FFF2-40B4-BE49-F238E27FC236}">
+                <a16:creationId xmlns:a16="http://schemas.microsoft.com/office/drawing/2014/main" id="{02125E7A-7789-D1EB-2E98-A04A906E479B}"/>
+              </a:ext>
+            </a:extLst>
+          </p:cNvPr>
+          <p:cNvSpPr>
+            <a:spLocks noGrp="1"/>
+          </p:cNvSpPr>
+          <p:nvPr>
+            <p:ph idx="1"/>
+          </p:nvPr>
+        </p:nvSpPr>
+        <p:spPr/>
+        <p:txBody>
+          <a:bodyPr/>
+          <a:lstStyle/>
+          <a:p>
+            <a:r>
+              <a:rPr lang="en-US" dirty="0"/>
+              <a:t>Input: </a:t>
+            </a:r>
+            <a:r>
+              <a:rPr lang="en-US" dirty="0" err="1"/>
+              <a:t>Helloworld</a:t>
+            </a:r>
+            <a:r>
+              <a:rPr lang="en-US" dirty="0"/>
+              <a:t> program written in C</a:t>
+            </a:r>
+          </a:p>
+          <a:p>
+            <a:r>
+              <a:rPr lang="en-US" dirty="0"/>
+              <a:t>Cross compiler: </a:t>
+            </a:r>
+            <a:r>
+              <a:rPr lang="en-US" dirty="0">
+                <a:hlinkClick r:id="rId2"/>
+              </a:rPr>
+              <a:t>https://</a:t>
+            </a:r>
+            <a:r>
+              <a:rPr lang="en-US" dirty="0" err="1">
+                <a:hlinkClick r:id="rId2"/>
+              </a:rPr>
+              <a:t>github.com</a:t>
+            </a:r>
+            <a:r>
+              <a:rPr lang="en-US" dirty="0">
+                <a:hlinkClick r:id="rId2"/>
+              </a:rPr>
+              <a:t>/</a:t>
+            </a:r>
+            <a:r>
+              <a:rPr lang="en-US" dirty="0" err="1">
+                <a:hlinkClick r:id="rId2"/>
+              </a:rPr>
+              <a:t>riscv</a:t>
+            </a:r>
+            <a:r>
+              <a:rPr lang="en-US" dirty="0">
+                <a:hlinkClick r:id="rId2"/>
+              </a:rPr>
+              <a:t>-collab/</a:t>
+            </a:r>
+            <a:r>
+              <a:rPr lang="en-US" dirty="0" err="1">
+                <a:hlinkClick r:id="rId2"/>
+              </a:rPr>
+              <a:t>riscv</a:t>
+            </a:r>
+            <a:r>
+              <a:rPr lang="en-US" dirty="0">
+                <a:hlinkClick r:id="rId2"/>
+              </a:rPr>
+              <a:t>-gnu-toolchain</a:t>
+            </a:r>
+            <a:endParaRPr lang="en-US" dirty="0"/>
+          </a:p>
+          <a:p>
+            <a:r>
+              <a:rPr lang="en-US" dirty="0"/>
+              <a:t>Platforms:</a:t>
+            </a:r>
+          </a:p>
+          <a:p>
+            <a:pPr lvl="1"/>
+            <a:r>
+              <a:rPr lang="en-US" dirty="0"/>
+              <a:t>On Linux environment</a:t>
+            </a:r>
+          </a:p>
+          <a:p>
+            <a:pPr lvl="1"/>
+            <a:r>
+              <a:rPr lang="en-US" dirty="0"/>
+              <a:t>With </a:t>
+            </a:r>
+            <a:r>
+              <a:rPr lang="en-US" dirty="0" err="1"/>
+              <a:t>Dockerfile</a:t>
+            </a:r>
+            <a:endParaRPr lang="en-US" dirty="0"/>
+          </a:p>
+          <a:p>
+            <a:r>
+              <a:rPr lang="en-US" dirty="0"/>
+              <a:t>Output: </a:t>
+            </a:r>
+            <a:r>
+              <a:rPr lang="en-US" dirty="0" err="1"/>
+              <a:t>helloworld</a:t>
+            </a:r>
+            <a:r>
+              <a:rPr lang="en-US" dirty="0"/>
+              <a:t> executable in RISC-V architecture.</a:t>
+            </a:r>
+          </a:p>
+        </p:txBody>
+      </p:sp>
+      <p:sp>
+        <p:nvSpPr>
           <p:cNvPr id="4" name="Slide Number Placeholder 3">
             <a:extLst>
               <a:ext uri="{FF2B5EF4-FFF2-40B4-BE49-F238E27FC236}">
-                <a16:creationId xmlns:a16="http://schemas.microsoft.com/office/drawing/2014/main" id="{3C33D0C7-3F6D-18D0-190C-C130FCB79AB1}"/>
+                <a16:creationId xmlns:a16="http://schemas.microsoft.com/office/drawing/2014/main" id="{79F43829-5883-433D-413B-51C6A3B608E1}"/>
               </a:ext>
             </a:extLst>
           </p:cNvPr>
@@ -6694,63 +7062,10 @@
           </a:p>
         </p:txBody>
       </p:sp>
-      <p:sp>
-        <p:nvSpPr>
-          <p:cNvPr id="5" name="Title 4">
-            <a:extLst>
-              <a:ext uri="{FF2B5EF4-FFF2-40B4-BE49-F238E27FC236}">
-                <a16:creationId xmlns:a16="http://schemas.microsoft.com/office/drawing/2014/main" id="{3E191671-5642-B385-6610-D2D8AF7DE14C}"/>
-              </a:ext>
-            </a:extLst>
-          </p:cNvPr>
-          <p:cNvSpPr>
-            <a:spLocks noGrp="1"/>
-          </p:cNvSpPr>
-          <p:nvPr>
-            <p:ph type="ctrTitle"/>
-          </p:nvPr>
-        </p:nvSpPr>
-        <p:spPr/>
-        <p:txBody>
-          <a:bodyPr/>
-          <a:lstStyle/>
-          <a:p>
-            <a:r>
-              <a:rPr lang="en-US" dirty="0"/>
-              <a:t>Design Space Exploration</a:t>
-            </a:r>
-          </a:p>
-        </p:txBody>
-      </p:sp>
-      <p:sp>
-        <p:nvSpPr>
-          <p:cNvPr id="6" name="Text Placeholder 5">
-            <a:extLst>
-              <a:ext uri="{FF2B5EF4-FFF2-40B4-BE49-F238E27FC236}">
-                <a16:creationId xmlns:a16="http://schemas.microsoft.com/office/drawing/2014/main" id="{8C7AF401-3767-94D7-5B4E-EE09DB77D988}"/>
-              </a:ext>
-            </a:extLst>
-          </p:cNvPr>
-          <p:cNvSpPr>
-            <a:spLocks noGrp="1"/>
-          </p:cNvSpPr>
-          <p:nvPr>
-            <p:ph type="body" sz="quarter" idx="10"/>
-          </p:nvPr>
-        </p:nvSpPr>
-        <p:spPr/>
-        <p:txBody>
-          <a:bodyPr/>
-          <a:lstStyle/>
-          <a:p>
-            <a:endParaRPr lang="en-US"/>
-          </a:p>
-        </p:txBody>
-      </p:sp>
     </p:spTree>
     <p:extLst>
       <p:ext uri="{BB962C8B-B14F-4D97-AF65-F5344CB8AC3E}">
-        <p14:creationId xmlns:p14="http://schemas.microsoft.com/office/powerpoint/2010/main" val="80177110"/>
+        <p14:creationId xmlns:p14="http://schemas.microsoft.com/office/powerpoint/2010/main" val="2141560634"/>
       </p:ext>
     </p:extLst>
   </p:cSld>
@@ -6782,7 +7097,7 @@
           <p:cNvPr id="2" name="Title 1">
             <a:extLst>
               <a:ext uri="{FF2B5EF4-FFF2-40B4-BE49-F238E27FC236}">
-                <a16:creationId xmlns:a16="http://schemas.microsoft.com/office/drawing/2014/main" id="{0F1DF231-5DC8-50BA-85E7-6CD3C9AC33F3}"/>
+                <a16:creationId xmlns:a16="http://schemas.microsoft.com/office/drawing/2014/main" id="{30D87027-AB89-A4B7-45DE-4875F283CFEC}"/>
               </a:ext>
             </a:extLst>
           </p:cNvPr>
@@ -6795,16 +7110,14 @@
         </p:nvSpPr>
         <p:spPr/>
         <p:txBody>
-          <a:bodyPr/>
+          <a:bodyPr>
+            <a:normAutofit/>
+          </a:bodyPr>
           <a:lstStyle/>
           <a:p>
             <a:r>
-              <a:rPr lang="en-US" dirty="0" err="1"/>
-              <a:t>PerfVec</a:t>
-            </a:r>
-            <a:r>
-              <a:rPr lang="en-US" dirty="0"/>
-              <a:t> Use Cases</a:t>
+              <a:rPr lang="en-US" sz="4000" dirty="0"/>
+              <a:t>Demo: gem5 simulation &amp; trace generation</a:t>
             </a:r>
           </a:p>
         </p:txBody>
@@ -6814,7 +7127,7 @@
           <p:cNvPr id="3" name="Content Placeholder 2">
             <a:extLst>
               <a:ext uri="{FF2B5EF4-FFF2-40B4-BE49-F238E27FC236}">
-                <a16:creationId xmlns:a16="http://schemas.microsoft.com/office/drawing/2014/main" id="{58325154-74F1-58A8-CFB3-391DBEE637D4}"/>
+                <a16:creationId xmlns:a16="http://schemas.microsoft.com/office/drawing/2014/main" id="{DCC90928-E0F0-D6EC-8851-3B9B8E581970}"/>
               </a:ext>
             </a:extLst>
           </p:cNvPr>
@@ -6832,69 +7145,69 @@
           <a:p>
             <a:r>
               <a:rPr lang="en-US" dirty="0"/>
-              <a:t>Performance modeling is essential for many tasks.</a:t>
-            </a:r>
-          </a:p>
-          <a:p>
-            <a:pPr lvl="1"/>
+              <a:t>Input: executable</a:t>
+            </a:r>
+          </a:p>
+          <a:p>
+            <a:r>
+              <a:rPr lang="en-US" dirty="0"/>
+              <a:t>Simulator: gem5 </a:t>
+            </a:r>
+            <a:r>
+              <a:rPr lang="en-US" dirty="0">
+                <a:hlinkClick r:id="rId3"/>
+              </a:rPr>
+              <a:t>https://</a:t>
+            </a:r>
+            <a:r>
+              <a:rPr lang="en-US" dirty="0" err="1">
+                <a:hlinkClick r:id="rId3"/>
+              </a:rPr>
+              <a:t>github.com</a:t>
+            </a:r>
+            <a:r>
+              <a:rPr lang="en-US" dirty="0">
+                <a:hlinkClick r:id="rId3"/>
+              </a:rPr>
+              <a:t>/</a:t>
+            </a:r>
+            <a:r>
+              <a:rPr lang="en-US" dirty="0" err="1">
+                <a:hlinkClick r:id="rId3"/>
+              </a:rPr>
+              <a:t>lingda</a:t>
+            </a:r>
+            <a:r>
+              <a:rPr lang="en-US" dirty="0">
+                <a:hlinkClick r:id="rId3"/>
+              </a:rPr>
+              <a:t>-li/gem5/tree/</a:t>
+            </a:r>
+            <a:r>
+              <a:rPr lang="en-US" dirty="0" err="1">
+                <a:hlinkClick r:id="rId3"/>
+              </a:rPr>
+              <a:t>riscv</a:t>
+            </a:r>
+            <a:endParaRPr lang="en-US" dirty="0"/>
+          </a:p>
+          <a:p>
+            <a:r>
+              <a:rPr lang="en-US" dirty="0"/>
+              <a:t>Output: </a:t>
+            </a:r>
             <a:r>
               <a:rPr lang="en-US" dirty="0" err="1"/>
-              <a:t>PerfVec</a:t>
+              <a:t>trace.txt</a:t>
             </a:r>
             <a:r>
               <a:rPr lang="en-US" dirty="0"/>
-              <a:t> can be used in them.</a:t>
-            </a:r>
-          </a:p>
-          <a:p>
-            <a:r>
-              <a:rPr lang="en-US" dirty="0"/>
-              <a:t>A case study: design space exploration (DSE)</a:t>
-            </a:r>
-          </a:p>
-          <a:p>
-            <a:pPr lvl="1"/>
-            <a:r>
-              <a:rPr lang="en-US" dirty="0"/>
-              <a:t>Find the optimal design(s) given one/multiple objective function(s)</a:t>
-            </a:r>
-          </a:p>
-          <a:p>
-            <a:r>
-              <a:rPr lang="en-US" dirty="0"/>
-              <a:t>DSE example: L1 and L2 cache size exploration</a:t>
-            </a:r>
-          </a:p>
-          <a:p>
-            <a:pPr lvl="1"/>
-            <a:r>
-              <a:rPr lang="en-US" dirty="0"/>
-              <a:t>Objective function: </a:t>
+              <a:t> and </a:t>
             </a:r>
             <a:r>
               <a:rPr lang="en-US" dirty="0" err="1"/>
-              <a:t>execution_time</a:t>
-            </a:r>
-            <a:r>
-              <a:rPr lang="en-US" dirty="0"/>
-              <a:t> * (1000 + 10*L1_size + L2_size)</a:t>
-            </a:r>
-          </a:p>
-          <a:p>
-            <a:pPr lvl="2"/>
-            <a:r>
-              <a:rPr lang="en-US" dirty="0"/>
-              <a:t>Similar to latency area product</a:t>
-            </a:r>
-          </a:p>
-          <a:p>
-            <a:pPr lvl="1"/>
-            <a:r>
-              <a:rPr lang="en-US" dirty="0"/>
-              <a:t>Select the best cache sizes for 17 SPEC CPU2017 benchmarks</a:t>
-            </a:r>
-          </a:p>
-          <a:p>
+              <a:t>trace.sq.txt</a:t>
+            </a:r>
             <a:endParaRPr lang="en-US" dirty="0"/>
           </a:p>
         </p:txBody>
@@ -6904,7 +7217,7 @@
           <p:cNvPr id="4" name="Slide Number Placeholder 3">
             <a:extLst>
               <a:ext uri="{FF2B5EF4-FFF2-40B4-BE49-F238E27FC236}">
-                <a16:creationId xmlns:a16="http://schemas.microsoft.com/office/drawing/2014/main" id="{6B677A54-E5A7-18DD-43EA-C5674A776275}"/>
+                <a16:creationId xmlns:a16="http://schemas.microsoft.com/office/drawing/2014/main" id="{BF84EEF6-BFB6-607E-44AE-C2BAD13EA5E0}"/>
               </a:ext>
             </a:extLst>
           </p:cNvPr>
@@ -6924,6 +7237,435 @@
               <a:rPr lang="en-US" smtClean="0"/>
               <a:pPr/>
               <a:t>16</a:t>
+            </a:fld>
+            <a:endParaRPr lang="en-US" sz="1000" dirty="0"/>
+          </a:p>
+        </p:txBody>
+      </p:sp>
+    </p:spTree>
+    <p:extLst>
+      <p:ext uri="{BB962C8B-B14F-4D97-AF65-F5344CB8AC3E}">
+        <p14:creationId xmlns:p14="http://schemas.microsoft.com/office/powerpoint/2010/main" val="1107933813"/>
+      </p:ext>
+    </p:extLst>
+  </p:cSld>
+  <p:clrMapOvr>
+    <a:masterClrMapping/>
+  </p:clrMapOvr>
+</p:sld>
+</file>
+
+<file path=ppt/slides/slide17.xml><?xml version="1.0" encoding="utf-8"?>
+<p:sld xmlns:a="http://schemas.openxmlformats.org/drawingml/2006/main" xmlns:r="http://schemas.openxmlformats.org/officeDocument/2006/relationships" xmlns:p="http://schemas.openxmlformats.org/presentationml/2006/main">
+  <p:cSld>
+    <p:spTree>
+      <p:nvGrpSpPr>
+        <p:cNvPr id="1" name=""/>
+        <p:cNvGrpSpPr/>
+        <p:nvPr/>
+      </p:nvGrpSpPr>
+      <p:grpSpPr>
+        <a:xfrm>
+          <a:off x="0" y="0"/>
+          <a:ext cx="0" cy="0"/>
+          <a:chOff x="0" y="0"/>
+          <a:chExt cx="0" cy="0"/>
+        </a:xfrm>
+      </p:grpSpPr>
+      <p:sp>
+        <p:nvSpPr>
+          <p:cNvPr id="2" name="Title 1">
+            <a:extLst>
+              <a:ext uri="{FF2B5EF4-FFF2-40B4-BE49-F238E27FC236}">
+                <a16:creationId xmlns:a16="http://schemas.microsoft.com/office/drawing/2014/main" id="{DF84E109-726A-44C3-29AF-83D99AC44C03}"/>
+              </a:ext>
+            </a:extLst>
+          </p:cNvPr>
+          <p:cNvSpPr>
+            <a:spLocks noGrp="1"/>
+          </p:cNvSpPr>
+          <p:nvPr>
+            <p:ph type="title"/>
+          </p:nvPr>
+        </p:nvSpPr>
+        <p:spPr/>
+        <p:txBody>
+          <a:bodyPr/>
+          <a:lstStyle/>
+          <a:p>
+            <a:r>
+              <a:rPr lang="en-US" dirty="0"/>
+              <a:t>Hands-on: trace processing &amp; prediction</a:t>
+            </a:r>
+          </a:p>
+        </p:txBody>
+      </p:sp>
+      <p:sp>
+        <p:nvSpPr>
+          <p:cNvPr id="3" name="Content Placeholder 2">
+            <a:extLst>
+              <a:ext uri="{FF2B5EF4-FFF2-40B4-BE49-F238E27FC236}">
+                <a16:creationId xmlns:a16="http://schemas.microsoft.com/office/drawing/2014/main" id="{2DC1BFFB-30CB-D98A-ED00-5638E5E12BB3}"/>
+              </a:ext>
+            </a:extLst>
+          </p:cNvPr>
+          <p:cNvSpPr>
+            <a:spLocks noGrp="1"/>
+          </p:cNvSpPr>
+          <p:nvPr>
+            <p:ph idx="1"/>
+          </p:nvPr>
+        </p:nvSpPr>
+        <p:spPr/>
+        <p:txBody>
+          <a:bodyPr/>
+          <a:lstStyle/>
+          <a:p>
+            <a:r>
+              <a:rPr lang="en-US" dirty="0"/>
+              <a:t>Google </a:t>
+            </a:r>
+            <a:r>
+              <a:rPr lang="en-US" dirty="0" err="1"/>
+              <a:t>Colab</a:t>
+            </a:r>
+            <a:r>
+              <a:rPr lang="en-US" dirty="0"/>
+              <a:t> notebook</a:t>
+            </a:r>
+          </a:p>
+          <a:p>
+            <a:pPr lvl="1"/>
+            <a:r>
+              <a:rPr lang="en-US" dirty="0">
+                <a:hlinkClick r:id="rId3"/>
+              </a:rPr>
+              <a:t>https://colab.research.google.com/drive/1ViJtzsbbUFXkSEYsdgne9iJsfCZq0UvJ#scrollTo=IS-7Ugikt7Cl</a:t>
+            </a:r>
+            <a:endParaRPr lang="en-US" dirty="0"/>
+          </a:p>
+        </p:txBody>
+      </p:sp>
+      <p:sp>
+        <p:nvSpPr>
+          <p:cNvPr id="4" name="Slide Number Placeholder 3">
+            <a:extLst>
+              <a:ext uri="{FF2B5EF4-FFF2-40B4-BE49-F238E27FC236}">
+                <a16:creationId xmlns:a16="http://schemas.microsoft.com/office/drawing/2014/main" id="{0CF7443E-707C-D043-577E-EAE5EC7385D9}"/>
+              </a:ext>
+            </a:extLst>
+          </p:cNvPr>
+          <p:cNvSpPr>
+            <a:spLocks noGrp="1"/>
+          </p:cNvSpPr>
+          <p:nvPr>
+            <p:ph type="sldNum" sz="quarter" idx="4"/>
+          </p:nvPr>
+        </p:nvSpPr>
+        <p:spPr/>
+        <p:txBody>
+          <a:bodyPr/>
+          <a:lstStyle/>
+          <a:p>
+            <a:fld id="{933A556B-7C63-244D-9B7C-B0EA8042B330}" type="slidenum">
+              <a:rPr lang="en-US" smtClean="0"/>
+              <a:pPr/>
+              <a:t>17</a:t>
+            </a:fld>
+            <a:endParaRPr lang="en-US" sz="1000" dirty="0"/>
+          </a:p>
+        </p:txBody>
+      </p:sp>
+    </p:spTree>
+    <p:extLst>
+      <p:ext uri="{BB962C8B-B14F-4D97-AF65-F5344CB8AC3E}">
+        <p14:creationId xmlns:p14="http://schemas.microsoft.com/office/powerpoint/2010/main" val="2986892675"/>
+      </p:ext>
+    </p:extLst>
+  </p:cSld>
+  <p:clrMapOvr>
+    <a:masterClrMapping/>
+  </p:clrMapOvr>
+</p:sld>
+</file>
+
+<file path=ppt/slides/slide18.xml><?xml version="1.0" encoding="utf-8"?>
+<p:sld xmlns:a="http://schemas.openxmlformats.org/drawingml/2006/main" xmlns:r="http://schemas.openxmlformats.org/officeDocument/2006/relationships" xmlns:p="http://schemas.openxmlformats.org/presentationml/2006/main">
+  <p:cSld>
+    <p:spTree>
+      <p:nvGrpSpPr>
+        <p:cNvPr id="1" name=""/>
+        <p:cNvGrpSpPr/>
+        <p:nvPr/>
+      </p:nvGrpSpPr>
+      <p:grpSpPr>
+        <a:xfrm>
+          <a:off x="0" y="0"/>
+          <a:ext cx="0" cy="0"/>
+          <a:chOff x="0" y="0"/>
+          <a:chExt cx="0" cy="0"/>
+        </a:xfrm>
+      </p:grpSpPr>
+      <p:sp>
+        <p:nvSpPr>
+          <p:cNvPr id="4" name="Slide Number Placeholder 3">
+            <a:extLst>
+              <a:ext uri="{FF2B5EF4-FFF2-40B4-BE49-F238E27FC236}">
+                <a16:creationId xmlns:a16="http://schemas.microsoft.com/office/drawing/2014/main" id="{3C33D0C7-3F6D-18D0-190C-C130FCB79AB1}"/>
+              </a:ext>
+            </a:extLst>
+          </p:cNvPr>
+          <p:cNvSpPr>
+            <a:spLocks noGrp="1"/>
+          </p:cNvSpPr>
+          <p:nvPr>
+            <p:ph type="sldNum" sz="quarter" idx="4"/>
+          </p:nvPr>
+        </p:nvSpPr>
+        <p:spPr/>
+        <p:txBody>
+          <a:bodyPr/>
+          <a:lstStyle/>
+          <a:p>
+            <a:fld id="{933A556B-7C63-244D-9B7C-B0EA8042B330}" type="slidenum">
+              <a:rPr lang="en-US" smtClean="0"/>
+              <a:pPr/>
+              <a:t>18</a:t>
+            </a:fld>
+            <a:endParaRPr lang="en-US" sz="1000" dirty="0"/>
+          </a:p>
+        </p:txBody>
+      </p:sp>
+      <p:sp>
+        <p:nvSpPr>
+          <p:cNvPr id="5" name="Title 4">
+            <a:extLst>
+              <a:ext uri="{FF2B5EF4-FFF2-40B4-BE49-F238E27FC236}">
+                <a16:creationId xmlns:a16="http://schemas.microsoft.com/office/drawing/2014/main" id="{3E191671-5642-B385-6610-D2D8AF7DE14C}"/>
+              </a:ext>
+            </a:extLst>
+          </p:cNvPr>
+          <p:cNvSpPr>
+            <a:spLocks noGrp="1"/>
+          </p:cNvSpPr>
+          <p:nvPr>
+            <p:ph type="ctrTitle"/>
+          </p:nvPr>
+        </p:nvSpPr>
+        <p:spPr/>
+        <p:txBody>
+          <a:bodyPr/>
+          <a:lstStyle/>
+          <a:p>
+            <a:r>
+              <a:rPr lang="en-US" dirty="0"/>
+              <a:t>Design Space Exploration</a:t>
+            </a:r>
+          </a:p>
+        </p:txBody>
+      </p:sp>
+      <p:sp>
+        <p:nvSpPr>
+          <p:cNvPr id="6" name="Text Placeholder 5">
+            <a:extLst>
+              <a:ext uri="{FF2B5EF4-FFF2-40B4-BE49-F238E27FC236}">
+                <a16:creationId xmlns:a16="http://schemas.microsoft.com/office/drawing/2014/main" id="{8C7AF401-3767-94D7-5B4E-EE09DB77D988}"/>
+              </a:ext>
+            </a:extLst>
+          </p:cNvPr>
+          <p:cNvSpPr>
+            <a:spLocks noGrp="1"/>
+          </p:cNvSpPr>
+          <p:nvPr>
+            <p:ph type="body" sz="quarter" idx="10"/>
+          </p:nvPr>
+        </p:nvSpPr>
+        <p:spPr/>
+        <p:txBody>
+          <a:bodyPr/>
+          <a:lstStyle/>
+          <a:p>
+            <a:endParaRPr lang="en-US"/>
+          </a:p>
+        </p:txBody>
+      </p:sp>
+    </p:spTree>
+    <p:extLst>
+      <p:ext uri="{BB962C8B-B14F-4D97-AF65-F5344CB8AC3E}">
+        <p14:creationId xmlns:p14="http://schemas.microsoft.com/office/powerpoint/2010/main" val="80177110"/>
+      </p:ext>
+    </p:extLst>
+  </p:cSld>
+  <p:clrMapOvr>
+    <a:masterClrMapping/>
+  </p:clrMapOvr>
+</p:sld>
+</file>
+
+<file path=ppt/slides/slide19.xml><?xml version="1.0" encoding="utf-8"?>
+<p:sld xmlns:a="http://schemas.openxmlformats.org/drawingml/2006/main" xmlns:r="http://schemas.openxmlformats.org/officeDocument/2006/relationships" xmlns:p="http://schemas.openxmlformats.org/presentationml/2006/main">
+  <p:cSld>
+    <p:spTree>
+      <p:nvGrpSpPr>
+        <p:cNvPr id="1" name=""/>
+        <p:cNvGrpSpPr/>
+        <p:nvPr/>
+      </p:nvGrpSpPr>
+      <p:grpSpPr>
+        <a:xfrm>
+          <a:off x="0" y="0"/>
+          <a:ext cx="0" cy="0"/>
+          <a:chOff x="0" y="0"/>
+          <a:chExt cx="0" cy="0"/>
+        </a:xfrm>
+      </p:grpSpPr>
+      <p:sp>
+        <p:nvSpPr>
+          <p:cNvPr id="2" name="Title 1">
+            <a:extLst>
+              <a:ext uri="{FF2B5EF4-FFF2-40B4-BE49-F238E27FC236}">
+                <a16:creationId xmlns:a16="http://schemas.microsoft.com/office/drawing/2014/main" id="{0F1DF231-5DC8-50BA-85E7-6CD3C9AC33F3}"/>
+              </a:ext>
+            </a:extLst>
+          </p:cNvPr>
+          <p:cNvSpPr>
+            <a:spLocks noGrp="1"/>
+          </p:cNvSpPr>
+          <p:nvPr>
+            <p:ph type="title"/>
+          </p:nvPr>
+        </p:nvSpPr>
+        <p:spPr/>
+        <p:txBody>
+          <a:bodyPr/>
+          <a:lstStyle/>
+          <a:p>
+            <a:r>
+              <a:rPr lang="en-US" dirty="0" err="1"/>
+              <a:t>PerfVec</a:t>
+            </a:r>
+            <a:r>
+              <a:rPr lang="en-US" dirty="0"/>
+              <a:t> Use Cases</a:t>
+            </a:r>
+          </a:p>
+        </p:txBody>
+      </p:sp>
+      <p:sp>
+        <p:nvSpPr>
+          <p:cNvPr id="3" name="Content Placeholder 2">
+            <a:extLst>
+              <a:ext uri="{FF2B5EF4-FFF2-40B4-BE49-F238E27FC236}">
+                <a16:creationId xmlns:a16="http://schemas.microsoft.com/office/drawing/2014/main" id="{58325154-74F1-58A8-CFB3-391DBEE637D4}"/>
+              </a:ext>
+            </a:extLst>
+          </p:cNvPr>
+          <p:cNvSpPr>
+            <a:spLocks noGrp="1"/>
+          </p:cNvSpPr>
+          <p:nvPr>
+            <p:ph idx="1"/>
+          </p:nvPr>
+        </p:nvSpPr>
+        <p:spPr/>
+        <p:txBody>
+          <a:bodyPr/>
+          <a:lstStyle/>
+          <a:p>
+            <a:r>
+              <a:rPr lang="en-US" dirty="0"/>
+              <a:t>Performance modeling is essential for many tasks.</a:t>
+            </a:r>
+          </a:p>
+          <a:p>
+            <a:pPr lvl="1"/>
+            <a:r>
+              <a:rPr lang="en-US" dirty="0" err="1"/>
+              <a:t>PerfVec</a:t>
+            </a:r>
+            <a:r>
+              <a:rPr lang="en-US" dirty="0"/>
+              <a:t> can be used in them.</a:t>
+            </a:r>
+          </a:p>
+          <a:p>
+            <a:r>
+              <a:rPr lang="en-US" dirty="0"/>
+              <a:t>A case study: design space exploration (DSE)</a:t>
+            </a:r>
+          </a:p>
+          <a:p>
+            <a:pPr lvl="1"/>
+            <a:r>
+              <a:rPr lang="en-US" dirty="0"/>
+              <a:t>Find the optimal design(s) given one/multiple objective function(s)</a:t>
+            </a:r>
+          </a:p>
+          <a:p>
+            <a:r>
+              <a:rPr lang="en-US" dirty="0"/>
+              <a:t>DSE example: L1 and L2 cache size exploration</a:t>
+            </a:r>
+          </a:p>
+          <a:p>
+            <a:pPr lvl="1"/>
+            <a:r>
+              <a:rPr lang="en-US" dirty="0"/>
+              <a:t>Objective function: </a:t>
+            </a:r>
+            <a:r>
+              <a:rPr lang="en-US" dirty="0" err="1"/>
+              <a:t>execution_time</a:t>
+            </a:r>
+            <a:r>
+              <a:rPr lang="en-US" dirty="0"/>
+              <a:t> * (1000 + 10*L1_size + L2_size)</a:t>
+            </a:r>
+          </a:p>
+          <a:p>
+            <a:pPr lvl="2"/>
+            <a:r>
+              <a:rPr lang="en-US" dirty="0"/>
+              <a:t>Similar to latency area product</a:t>
+            </a:r>
+          </a:p>
+          <a:p>
+            <a:pPr lvl="1"/>
+            <a:r>
+              <a:rPr lang="en-US" dirty="0"/>
+              <a:t>Select the best cache sizes for 17 SPEC CPU2017 benchmarks</a:t>
+            </a:r>
+          </a:p>
+          <a:p>
+            <a:endParaRPr lang="en-US" dirty="0"/>
+          </a:p>
+        </p:txBody>
+      </p:sp>
+      <p:sp>
+        <p:nvSpPr>
+          <p:cNvPr id="4" name="Slide Number Placeholder 3">
+            <a:extLst>
+              <a:ext uri="{FF2B5EF4-FFF2-40B4-BE49-F238E27FC236}">
+                <a16:creationId xmlns:a16="http://schemas.microsoft.com/office/drawing/2014/main" id="{6B677A54-E5A7-18DD-43EA-C5674A776275}"/>
+              </a:ext>
+            </a:extLst>
+          </p:cNvPr>
+          <p:cNvSpPr>
+            <a:spLocks noGrp="1"/>
+          </p:cNvSpPr>
+          <p:nvPr>
+            <p:ph type="sldNum" sz="quarter" idx="4"/>
+          </p:nvPr>
+        </p:nvSpPr>
+        <p:spPr/>
+        <p:txBody>
+          <a:bodyPr/>
+          <a:lstStyle/>
+          <a:p>
+            <a:fld id="{933A556B-7C63-244D-9B7C-B0EA8042B330}" type="slidenum">
+              <a:rPr lang="en-US" smtClean="0"/>
+              <a:pPr/>
+              <a:t>19</a:t>
             </a:fld>
             <a:endParaRPr lang="en-US" sz="1000" dirty="0"/>
           </a:p>
@@ -6942,7 +7684,174 @@
 </p:sld>
 </file>
 
-<file path=ppt/slides/slide17.xml><?xml version="1.0" encoding="utf-8"?>
+<file path=ppt/slides/slide2.xml><?xml version="1.0" encoding="utf-8"?>
+<p:sld xmlns:a="http://schemas.openxmlformats.org/drawingml/2006/main" xmlns:r="http://schemas.openxmlformats.org/officeDocument/2006/relationships" xmlns:p="http://schemas.openxmlformats.org/presentationml/2006/main">
+  <p:cSld>
+    <p:spTree>
+      <p:nvGrpSpPr>
+        <p:cNvPr id="1" name=""/>
+        <p:cNvGrpSpPr/>
+        <p:nvPr/>
+      </p:nvGrpSpPr>
+      <p:grpSpPr>
+        <a:xfrm>
+          <a:off x="0" y="0"/>
+          <a:ext cx="0" cy="0"/>
+          <a:chOff x="0" y="0"/>
+          <a:chExt cx="0" cy="0"/>
+        </a:xfrm>
+      </p:grpSpPr>
+      <p:sp>
+        <p:nvSpPr>
+          <p:cNvPr id="5" name="Title 4">
+            <a:extLst>
+              <a:ext uri="{FF2B5EF4-FFF2-40B4-BE49-F238E27FC236}">
+                <a16:creationId xmlns:a16="http://schemas.microsoft.com/office/drawing/2014/main" id="{3D944610-B03C-6E8A-77C9-40548C4787DE}"/>
+              </a:ext>
+            </a:extLst>
+          </p:cNvPr>
+          <p:cNvSpPr>
+            <a:spLocks noGrp="1"/>
+          </p:cNvSpPr>
+          <p:nvPr>
+            <p:ph type="title"/>
+          </p:nvPr>
+        </p:nvSpPr>
+        <p:spPr/>
+        <p:txBody>
+          <a:bodyPr/>
+          <a:lstStyle/>
+          <a:p>
+            <a:r>
+              <a:rPr lang="en-US" dirty="0"/>
+              <a:t>Agenda</a:t>
+            </a:r>
+          </a:p>
+        </p:txBody>
+      </p:sp>
+      <p:sp>
+        <p:nvSpPr>
+          <p:cNvPr id="6" name="Content Placeholder 5">
+            <a:extLst>
+              <a:ext uri="{FF2B5EF4-FFF2-40B4-BE49-F238E27FC236}">
+                <a16:creationId xmlns:a16="http://schemas.microsoft.com/office/drawing/2014/main" id="{71FA0171-D20F-D763-FF37-2A204F058BD9}"/>
+              </a:ext>
+            </a:extLst>
+          </p:cNvPr>
+          <p:cNvSpPr>
+            <a:spLocks noGrp="1"/>
+          </p:cNvSpPr>
+          <p:nvPr>
+            <p:ph idx="1"/>
+          </p:nvPr>
+        </p:nvSpPr>
+        <p:spPr/>
+        <p:txBody>
+          <a:bodyPr/>
+          <a:lstStyle/>
+          <a:p>
+            <a:r>
+              <a:rPr lang="en-US" dirty="0" err="1"/>
+              <a:t>PerfVec</a:t>
+            </a:r>
+            <a:r>
+              <a:rPr lang="en-US" dirty="0"/>
+              <a:t> overview (30 mins)</a:t>
+            </a:r>
+          </a:p>
+          <a:p>
+            <a:r>
+              <a:rPr lang="en-US" dirty="0"/>
+              <a:t>Performance prediction demo/hands-on (30 mins)</a:t>
+            </a:r>
+          </a:p>
+          <a:p>
+            <a:r>
+              <a:rPr lang="en-US" dirty="0"/>
+              <a:t>Design space exploration (15 mins)</a:t>
+            </a:r>
+          </a:p>
+          <a:p>
+            <a:r>
+              <a:rPr lang="en-US" dirty="0"/>
+              <a:t>Source code (5 mins)</a:t>
+            </a:r>
+          </a:p>
+          <a:p>
+            <a:r>
+              <a:rPr lang="en-US" dirty="0"/>
+              <a:t>Open discussion (10 mins)</a:t>
+            </a:r>
+          </a:p>
+          <a:p>
+            <a:endParaRPr lang="en-US" dirty="0"/>
+          </a:p>
+          <a:p>
+            <a:r>
+              <a:rPr lang="en-US" dirty="0"/>
+              <a:t>Repository: </a:t>
+            </a:r>
+            <a:r>
+              <a:rPr lang="en-US" dirty="0">
+                <a:hlinkClick r:id="rId2"/>
+              </a:rPr>
+              <a:t>https://github.com/PerfVec/PerfVec</a:t>
+            </a:r>
+            <a:endParaRPr lang="en-US" dirty="0"/>
+          </a:p>
+          <a:p>
+            <a:pPr lvl="1"/>
+            <a:r>
+              <a:rPr lang="en-US" dirty="0"/>
+              <a:t>Source code and other materials used in this tutorial</a:t>
+            </a:r>
+          </a:p>
+        </p:txBody>
+      </p:sp>
+      <p:pic>
+        <p:nvPicPr>
+          <p:cNvPr id="7" name="Content Placeholder 5" descr="A qr code on a white background&#10;&#10;Description automatically generated">
+            <a:extLst>
+              <a:ext uri="{FF2B5EF4-FFF2-40B4-BE49-F238E27FC236}">
+                <a16:creationId xmlns:a16="http://schemas.microsoft.com/office/drawing/2014/main" id="{0C906703-44CA-9517-FC41-67883A06A93C}"/>
+              </a:ext>
+            </a:extLst>
+          </p:cNvPr>
+          <p:cNvPicPr>
+            <a:picLocks noChangeAspect="1"/>
+          </p:cNvPicPr>
+          <p:nvPr/>
+        </p:nvPicPr>
+        <p:blipFill>
+          <a:blip r:embed="rId3"/>
+          <a:stretch>
+            <a:fillRect/>
+          </a:stretch>
+        </p:blipFill>
+        <p:spPr>
+          <a:xfrm>
+            <a:off x="8829327" y="4394589"/>
+            <a:ext cx="1800000" cy="1800000"/>
+          </a:xfrm>
+          <a:prstGeom prst="rect">
+            <a:avLst/>
+          </a:prstGeom>
+        </p:spPr>
+      </p:pic>
+    </p:spTree>
+    <p:extLst>
+      <p:ext uri="{BB962C8B-B14F-4D97-AF65-F5344CB8AC3E}">
+        <p14:creationId xmlns:p14="http://schemas.microsoft.com/office/powerpoint/2010/main" val="1167342998"/>
+      </p:ext>
+    </p:extLst>
+  </p:cSld>
+  <p:clrMapOvr>
+    <a:masterClrMapping/>
+  </p:clrMapOvr>
+</p:sld>
+</file>
+
+<file path=ppt/slides/slide20.xml><?xml version="1.0" encoding="utf-8"?>
 <p:sld xmlns:a="http://schemas.openxmlformats.org/drawingml/2006/main" xmlns:r="http://schemas.openxmlformats.org/officeDocument/2006/relationships" xmlns:p="http://schemas.openxmlformats.org/presentationml/2006/main">
   <p:cSld>
     <p:spTree>
@@ -7131,7 +8040,7 @@
             <a:fld id="{933A556B-7C63-244D-9B7C-B0EA8042B330}" type="slidenum">
               <a:rPr lang="en-US" smtClean="0"/>
               <a:pPr/>
-              <a:t>17</a:t>
+              <a:t>20</a:t>
             </a:fld>
             <a:endParaRPr lang="en-US" sz="1000" dirty="0"/>
           </a:p>
@@ -7470,7 +8379,7 @@
 </p:sld>
 </file>
 
-<file path=ppt/slides/slide18.xml><?xml version="1.0" encoding="utf-8"?>
+<file path=ppt/slides/slide21.xml><?xml version="1.0" encoding="utf-8"?>
 <p:sld xmlns:a="http://schemas.openxmlformats.org/drawingml/2006/main" xmlns:r="http://schemas.openxmlformats.org/officeDocument/2006/relationships" xmlns:p="http://schemas.openxmlformats.org/presentationml/2006/main">
   <p:cSld>
     <p:spTree>
@@ -8228,7 +9137,7 @@
 </p:sld>
 </file>
 
-<file path=ppt/slides/slide19.xml><?xml version="1.0" encoding="utf-8"?>
+<file path=ppt/slides/slide22.xml><?xml version="1.0" encoding="utf-8"?>
 <p:sld xmlns:a="http://schemas.openxmlformats.org/drawingml/2006/main" xmlns:r="http://schemas.openxmlformats.org/officeDocument/2006/relationships" xmlns:p="http://schemas.openxmlformats.org/presentationml/2006/main">
   <p:cSld>
     <p:spTree>
@@ -8247,60 +9156,10 @@
       </p:grpSpPr>
       <p:sp>
         <p:nvSpPr>
-          <p:cNvPr id="2" name="Title 1">
-            <a:extLst>
-              <a:ext uri="{FF2B5EF4-FFF2-40B4-BE49-F238E27FC236}">
-                <a16:creationId xmlns:a16="http://schemas.microsoft.com/office/drawing/2014/main" id="{ACE392B1-841E-71A2-578A-17543C6AEB30}"/>
-              </a:ext>
-            </a:extLst>
-          </p:cNvPr>
-          <p:cNvSpPr>
-            <a:spLocks noGrp="1"/>
-          </p:cNvSpPr>
-          <p:nvPr>
-            <p:ph type="title"/>
-          </p:nvPr>
-        </p:nvSpPr>
-        <p:spPr/>
-        <p:txBody>
-          <a:bodyPr/>
-          <a:lstStyle/>
-          <a:p>
-            <a:endParaRPr lang="en-US"/>
-          </a:p>
-        </p:txBody>
-      </p:sp>
-      <p:sp>
-        <p:nvSpPr>
-          <p:cNvPr id="3" name="Content Placeholder 2">
-            <a:extLst>
-              <a:ext uri="{FF2B5EF4-FFF2-40B4-BE49-F238E27FC236}">
-                <a16:creationId xmlns:a16="http://schemas.microsoft.com/office/drawing/2014/main" id="{FE7943F8-9935-89CC-7060-C8CFD66714DB}"/>
-              </a:ext>
-            </a:extLst>
-          </p:cNvPr>
-          <p:cNvSpPr>
-            <a:spLocks noGrp="1"/>
-          </p:cNvSpPr>
-          <p:nvPr>
-            <p:ph idx="1"/>
-          </p:nvPr>
-        </p:nvSpPr>
-        <p:spPr/>
-        <p:txBody>
-          <a:bodyPr/>
-          <a:lstStyle/>
-          <a:p>
-            <a:endParaRPr lang="en-US"/>
-          </a:p>
-        </p:txBody>
-      </p:sp>
-      <p:sp>
-        <p:nvSpPr>
           <p:cNvPr id="4" name="Slide Number Placeholder 3">
             <a:extLst>
               <a:ext uri="{FF2B5EF4-FFF2-40B4-BE49-F238E27FC236}">
-                <a16:creationId xmlns:a16="http://schemas.microsoft.com/office/drawing/2014/main" id="{D920F1B7-F7C6-5451-0485-4445AC64640E}"/>
+                <a16:creationId xmlns:a16="http://schemas.microsoft.com/office/drawing/2014/main" id="{C3103C45-B760-B469-658C-CE5A8FA6CF05}"/>
               </a:ext>
             </a:extLst>
           </p:cNvPr>
@@ -8319,16 +9178,69 @@
             <a:fld id="{933A556B-7C63-244D-9B7C-B0EA8042B330}" type="slidenum">
               <a:rPr lang="en-US" smtClean="0"/>
               <a:pPr/>
-              <a:t>19</a:t>
+              <a:t>22</a:t>
             </a:fld>
             <a:endParaRPr lang="en-US" sz="1000" dirty="0"/>
+          </a:p>
+        </p:txBody>
+      </p:sp>
+      <p:sp>
+        <p:nvSpPr>
+          <p:cNvPr id="5" name="Title 4">
+            <a:extLst>
+              <a:ext uri="{FF2B5EF4-FFF2-40B4-BE49-F238E27FC236}">
+                <a16:creationId xmlns:a16="http://schemas.microsoft.com/office/drawing/2014/main" id="{2B0923F4-CBC0-A001-00D4-894A261C4186}"/>
+              </a:ext>
+            </a:extLst>
+          </p:cNvPr>
+          <p:cNvSpPr>
+            <a:spLocks noGrp="1"/>
+          </p:cNvSpPr>
+          <p:nvPr>
+            <p:ph type="ctrTitle"/>
+          </p:nvPr>
+        </p:nvSpPr>
+        <p:spPr/>
+        <p:txBody>
+          <a:bodyPr/>
+          <a:lstStyle/>
+          <a:p>
+            <a:r>
+              <a:rPr lang="en-US" dirty="0"/>
+              <a:t>Source Code</a:t>
+            </a:r>
+          </a:p>
+        </p:txBody>
+      </p:sp>
+      <p:sp>
+        <p:nvSpPr>
+          <p:cNvPr id="6" name="Text Placeholder 5">
+            <a:extLst>
+              <a:ext uri="{FF2B5EF4-FFF2-40B4-BE49-F238E27FC236}">
+                <a16:creationId xmlns:a16="http://schemas.microsoft.com/office/drawing/2014/main" id="{0E17C635-C460-4DB2-058B-8AD93E0B089B}"/>
+              </a:ext>
+            </a:extLst>
+          </p:cNvPr>
+          <p:cNvSpPr>
+            <a:spLocks noGrp="1"/>
+          </p:cNvSpPr>
+          <p:nvPr>
+            <p:ph type="body" sz="quarter" idx="10"/>
+          </p:nvPr>
+        </p:nvSpPr>
+        <p:spPr/>
+        <p:txBody>
+          <a:bodyPr/>
+          <a:lstStyle/>
+          <a:p>
+            <a:endParaRPr lang="en-US"/>
           </a:p>
         </p:txBody>
       </p:sp>
     </p:spTree>
     <p:extLst>
       <p:ext uri="{BB962C8B-B14F-4D97-AF65-F5344CB8AC3E}">
-        <p14:creationId xmlns:p14="http://schemas.microsoft.com/office/powerpoint/2010/main" val="3620566448"/>
+        <p14:creationId xmlns:p14="http://schemas.microsoft.com/office/powerpoint/2010/main" val="4236008000"/>
       </p:ext>
     </p:extLst>
   </p:cSld>
@@ -8338,7 +9250,7 @@
 </p:sld>
 </file>
 
-<file path=ppt/slides/slide2.xml><?xml version="1.0" encoding="utf-8"?>
+<file path=ppt/slides/slide23.xml><?xml version="1.0" encoding="utf-8"?>
 <p:sld xmlns:a="http://schemas.openxmlformats.org/drawingml/2006/main" xmlns:r="http://schemas.openxmlformats.org/officeDocument/2006/relationships" xmlns:p="http://schemas.openxmlformats.org/presentationml/2006/main">
   <p:cSld>
     <p:spTree>
@@ -8357,10 +9269,10 @@
       </p:grpSpPr>
       <p:sp>
         <p:nvSpPr>
-          <p:cNvPr id="5" name="Title 4">
-            <a:extLst>
-              <a:ext uri="{FF2B5EF4-FFF2-40B4-BE49-F238E27FC236}">
-                <a16:creationId xmlns:a16="http://schemas.microsoft.com/office/drawing/2014/main" id="{3D944610-B03C-6E8A-77C9-40548C4787DE}"/>
+          <p:cNvPr id="2" name="Title 1">
+            <a:extLst>
+              <a:ext uri="{FF2B5EF4-FFF2-40B4-BE49-F238E27FC236}">
+                <a16:creationId xmlns:a16="http://schemas.microsoft.com/office/drawing/2014/main" id="{8650215F-BEC0-21C8-95DB-9A9C723D1AAC}"/>
               </a:ext>
             </a:extLst>
           </p:cNvPr>
@@ -8378,17 +9290,17 @@
           <a:p>
             <a:r>
               <a:rPr lang="en-US" dirty="0"/>
-              <a:t>Agenda</a:t>
+              <a:t>Top Level Folders</a:t>
             </a:r>
           </a:p>
         </p:txBody>
       </p:sp>
       <p:sp>
         <p:nvSpPr>
-          <p:cNvPr id="6" name="Content Placeholder 5">
-            <a:extLst>
-              <a:ext uri="{FF2B5EF4-FFF2-40B4-BE49-F238E27FC236}">
-                <a16:creationId xmlns:a16="http://schemas.microsoft.com/office/drawing/2014/main" id="{71FA0171-D20F-D763-FF37-2A204F058BD9}"/>
+          <p:cNvPr id="3" name="Content Placeholder 2">
+            <a:extLst>
+              <a:ext uri="{FF2B5EF4-FFF2-40B4-BE49-F238E27FC236}">
+                <a16:creationId xmlns:a16="http://schemas.microsoft.com/office/drawing/2014/main" id="{EC55E382-CAE7-FF97-4302-8637070A54D2}"/>
               </a:ext>
             </a:extLst>
           </p:cNvPr>
@@ -8405,129 +9317,75 @@
           <a:lstStyle/>
           <a:p>
             <a:r>
+              <a:rPr lang="en-US" dirty="0"/>
+              <a:t>DP: data processing scripts for </a:t>
+            </a:r>
+            <a:br>
+              <a:rPr lang="en-US" dirty="0"/>
+            </a:br>
+            <a:r>
+              <a:rPr lang="en-US" dirty="0"/>
+              <a:t>simulation traces</a:t>
+            </a:r>
+          </a:p>
+          <a:p>
+            <a:pPr lvl="1"/>
+            <a:r>
+              <a:rPr lang="en-US" dirty="0"/>
+              <a:t>Implemented using Python (NumPy) and C++</a:t>
+            </a:r>
+          </a:p>
+          <a:p>
+            <a:r>
+              <a:rPr lang="en-US" dirty="0"/>
+              <a:t>ML: scripts for training, test, models, etc.</a:t>
+            </a:r>
+          </a:p>
+          <a:p>
+            <a:pPr lvl="1"/>
+            <a:r>
+              <a:rPr lang="en-US" dirty="0"/>
+              <a:t>Implemented using </a:t>
+            </a:r>
+            <a:r>
               <a:rPr lang="en-US" dirty="0" err="1"/>
-              <a:t>PerfVec</a:t>
-            </a:r>
+              <a:t>PyTorch</a:t>
+            </a:r>
+            <a:endParaRPr lang="en-US" dirty="0"/>
+          </a:p>
+          <a:p>
             <a:r>
               <a:rPr lang="en-US" dirty="0"/>
-              <a:t> overview (30 mins)</a:t>
+              <a:t>CFG: configuration files for datasets</a:t>
             </a:r>
           </a:p>
           <a:p>
             <a:r>
               <a:rPr lang="en-US" dirty="0"/>
-              <a:t>Performance prediction demo/hands-on (30 mins)</a:t>
-            </a:r>
-          </a:p>
-          <a:p>
-            <a:r>
+              <a:t>Tutorials: descriptive instructions and </a:t>
+            </a:r>
+            <a:br>
               <a:rPr lang="en-US" dirty="0"/>
-              <a:t>Design space exploration (15 mins)</a:t>
-            </a:r>
-          </a:p>
-          <a:p>
+            </a:br>
             <a:r>
               <a:rPr lang="en-US" dirty="0"/>
-              <a:t>Source code (5 mins)</a:t>
+              <a:t>documents</a:t>
             </a:r>
           </a:p>
           <a:p>
             <a:r>
               <a:rPr lang="en-US" dirty="0"/>
-              <a:t>Open discussion (10 mins)</a:t>
-            </a:r>
-          </a:p>
-          <a:p>
-            <a:endParaRPr lang="en-US" dirty="0"/>
-          </a:p>
-          <a:p>
-            <a:r>
-              <a:rPr lang="en-US" dirty="0"/>
-              <a:t>Repository: </a:t>
-            </a:r>
-            <a:r>
-              <a:rPr lang="en-US" dirty="0">
-                <a:hlinkClick r:id="rId2"/>
-              </a:rPr>
-              <a:t>https://github.com/PerfVec/PerfVec</a:t>
-            </a:r>
-            <a:endParaRPr lang="en-US" dirty="0"/>
-          </a:p>
-          <a:p>
-            <a:pPr lvl="1"/>
-            <a:r>
-              <a:rPr lang="en-US" dirty="0"/>
-              <a:t>Source code and other materials used in this tutorial</a:t>
+              <a:t>DA: data analysis scripts</a:t>
             </a:r>
           </a:p>
         </p:txBody>
       </p:sp>
-      <p:pic>
-        <p:nvPicPr>
-          <p:cNvPr id="7" name="Content Placeholder 5" descr="A qr code on a white background&#10;&#10;Description automatically generated">
-            <a:extLst>
-              <a:ext uri="{FF2B5EF4-FFF2-40B4-BE49-F238E27FC236}">
-                <a16:creationId xmlns:a16="http://schemas.microsoft.com/office/drawing/2014/main" id="{0C906703-44CA-9517-FC41-67883A06A93C}"/>
-              </a:ext>
-            </a:extLst>
-          </p:cNvPr>
-          <p:cNvPicPr>
-            <a:picLocks noChangeAspect="1"/>
-          </p:cNvPicPr>
-          <p:nvPr/>
-        </p:nvPicPr>
-        <p:blipFill>
-          <a:blip r:embed="rId3"/>
-          <a:stretch>
-            <a:fillRect/>
-          </a:stretch>
-        </p:blipFill>
-        <p:spPr>
-          <a:xfrm>
-            <a:off x="8829327" y="4394589"/>
-            <a:ext cx="1800000" cy="1800000"/>
-          </a:xfrm>
-          <a:prstGeom prst="rect">
-            <a:avLst/>
-          </a:prstGeom>
-        </p:spPr>
-      </p:pic>
-    </p:spTree>
-    <p:extLst>
-      <p:ext uri="{BB962C8B-B14F-4D97-AF65-F5344CB8AC3E}">
-        <p14:creationId xmlns:p14="http://schemas.microsoft.com/office/powerpoint/2010/main" val="1167342998"/>
-      </p:ext>
-    </p:extLst>
-  </p:cSld>
-  <p:clrMapOvr>
-    <a:masterClrMapping/>
-  </p:clrMapOvr>
-</p:sld>
-</file>
-
-<file path=ppt/slides/slide20.xml><?xml version="1.0" encoding="utf-8"?>
-<p:sld xmlns:a="http://schemas.openxmlformats.org/drawingml/2006/main" xmlns:r="http://schemas.openxmlformats.org/officeDocument/2006/relationships" xmlns:p="http://schemas.openxmlformats.org/presentationml/2006/main">
-  <p:cSld>
-    <p:spTree>
-      <p:nvGrpSpPr>
-        <p:cNvPr id="1" name=""/>
-        <p:cNvGrpSpPr/>
-        <p:nvPr/>
-      </p:nvGrpSpPr>
-      <p:grpSpPr>
-        <a:xfrm>
-          <a:off x="0" y="0"/>
-          <a:ext cx="0" cy="0"/>
-          <a:chOff x="0" y="0"/>
-          <a:chExt cx="0" cy="0"/>
-        </a:xfrm>
-      </p:grpSpPr>
       <p:sp>
         <p:nvSpPr>
           <p:cNvPr id="4" name="Slide Number Placeholder 3">
             <a:extLst>
               <a:ext uri="{FF2B5EF4-FFF2-40B4-BE49-F238E27FC236}">
-                <a16:creationId xmlns:a16="http://schemas.microsoft.com/office/drawing/2014/main" id="{C3103C45-B760-B469-658C-CE5A8FA6CF05}"/>
+                <a16:creationId xmlns:a16="http://schemas.microsoft.com/office/drawing/2014/main" id="{1E8D5409-7E14-C139-0D73-EBF3913E19C2}"/>
               </a:ext>
             </a:extLst>
           </p:cNvPr>
@@ -8546,233 +9404,7 @@
             <a:fld id="{933A556B-7C63-244D-9B7C-B0EA8042B330}" type="slidenum">
               <a:rPr lang="en-US" smtClean="0"/>
               <a:pPr/>
-              <a:t>20</a:t>
-            </a:fld>
-            <a:endParaRPr lang="en-US" sz="1000" dirty="0"/>
-          </a:p>
-        </p:txBody>
-      </p:sp>
-      <p:sp>
-        <p:nvSpPr>
-          <p:cNvPr id="5" name="Title 4">
-            <a:extLst>
-              <a:ext uri="{FF2B5EF4-FFF2-40B4-BE49-F238E27FC236}">
-                <a16:creationId xmlns:a16="http://schemas.microsoft.com/office/drawing/2014/main" id="{2B0923F4-CBC0-A001-00D4-894A261C4186}"/>
-              </a:ext>
-            </a:extLst>
-          </p:cNvPr>
-          <p:cNvSpPr>
-            <a:spLocks noGrp="1"/>
-          </p:cNvSpPr>
-          <p:nvPr>
-            <p:ph type="ctrTitle"/>
-          </p:nvPr>
-        </p:nvSpPr>
-        <p:spPr/>
-        <p:txBody>
-          <a:bodyPr/>
-          <a:lstStyle/>
-          <a:p>
-            <a:r>
-              <a:rPr lang="en-US" dirty="0"/>
-              <a:t>Source Code</a:t>
-            </a:r>
-          </a:p>
-        </p:txBody>
-      </p:sp>
-      <p:sp>
-        <p:nvSpPr>
-          <p:cNvPr id="6" name="Text Placeholder 5">
-            <a:extLst>
-              <a:ext uri="{FF2B5EF4-FFF2-40B4-BE49-F238E27FC236}">
-                <a16:creationId xmlns:a16="http://schemas.microsoft.com/office/drawing/2014/main" id="{0E17C635-C460-4DB2-058B-8AD93E0B089B}"/>
-              </a:ext>
-            </a:extLst>
-          </p:cNvPr>
-          <p:cNvSpPr>
-            <a:spLocks noGrp="1"/>
-          </p:cNvSpPr>
-          <p:nvPr>
-            <p:ph type="body" sz="quarter" idx="10"/>
-          </p:nvPr>
-        </p:nvSpPr>
-        <p:spPr/>
-        <p:txBody>
-          <a:bodyPr/>
-          <a:lstStyle/>
-          <a:p>
-            <a:endParaRPr lang="en-US"/>
-          </a:p>
-        </p:txBody>
-      </p:sp>
-    </p:spTree>
-    <p:extLst>
-      <p:ext uri="{BB962C8B-B14F-4D97-AF65-F5344CB8AC3E}">
-        <p14:creationId xmlns:p14="http://schemas.microsoft.com/office/powerpoint/2010/main" val="4236008000"/>
-      </p:ext>
-    </p:extLst>
-  </p:cSld>
-  <p:clrMapOvr>
-    <a:masterClrMapping/>
-  </p:clrMapOvr>
-</p:sld>
-</file>
-
-<file path=ppt/slides/slide21.xml><?xml version="1.0" encoding="utf-8"?>
-<p:sld xmlns:a="http://schemas.openxmlformats.org/drawingml/2006/main" xmlns:r="http://schemas.openxmlformats.org/officeDocument/2006/relationships" xmlns:p="http://schemas.openxmlformats.org/presentationml/2006/main">
-  <p:cSld>
-    <p:spTree>
-      <p:nvGrpSpPr>
-        <p:cNvPr id="1" name=""/>
-        <p:cNvGrpSpPr/>
-        <p:nvPr/>
-      </p:nvGrpSpPr>
-      <p:grpSpPr>
-        <a:xfrm>
-          <a:off x="0" y="0"/>
-          <a:ext cx="0" cy="0"/>
-          <a:chOff x="0" y="0"/>
-          <a:chExt cx="0" cy="0"/>
-        </a:xfrm>
-      </p:grpSpPr>
-      <p:sp>
-        <p:nvSpPr>
-          <p:cNvPr id="2" name="Title 1">
-            <a:extLst>
-              <a:ext uri="{FF2B5EF4-FFF2-40B4-BE49-F238E27FC236}">
-                <a16:creationId xmlns:a16="http://schemas.microsoft.com/office/drawing/2014/main" id="{8650215F-BEC0-21C8-95DB-9A9C723D1AAC}"/>
-              </a:ext>
-            </a:extLst>
-          </p:cNvPr>
-          <p:cNvSpPr>
-            <a:spLocks noGrp="1"/>
-          </p:cNvSpPr>
-          <p:nvPr>
-            <p:ph type="title"/>
-          </p:nvPr>
-        </p:nvSpPr>
-        <p:spPr/>
-        <p:txBody>
-          <a:bodyPr/>
-          <a:lstStyle/>
-          <a:p>
-            <a:r>
-              <a:rPr lang="en-US" dirty="0"/>
-              <a:t>Top Level Folders</a:t>
-            </a:r>
-          </a:p>
-        </p:txBody>
-      </p:sp>
-      <p:sp>
-        <p:nvSpPr>
-          <p:cNvPr id="3" name="Content Placeholder 2">
-            <a:extLst>
-              <a:ext uri="{FF2B5EF4-FFF2-40B4-BE49-F238E27FC236}">
-                <a16:creationId xmlns:a16="http://schemas.microsoft.com/office/drawing/2014/main" id="{EC55E382-CAE7-FF97-4302-8637070A54D2}"/>
-              </a:ext>
-            </a:extLst>
-          </p:cNvPr>
-          <p:cNvSpPr>
-            <a:spLocks noGrp="1"/>
-          </p:cNvSpPr>
-          <p:nvPr>
-            <p:ph idx="1"/>
-          </p:nvPr>
-        </p:nvSpPr>
-        <p:spPr/>
-        <p:txBody>
-          <a:bodyPr/>
-          <a:lstStyle/>
-          <a:p>
-            <a:r>
-              <a:rPr lang="en-US" dirty="0"/>
-              <a:t>DP: data processing scripts for </a:t>
-            </a:r>
-            <a:br>
-              <a:rPr lang="en-US" dirty="0"/>
-            </a:br>
-            <a:r>
-              <a:rPr lang="en-US" dirty="0"/>
-              <a:t>simulation traces</a:t>
-            </a:r>
-          </a:p>
-          <a:p>
-            <a:pPr lvl="1"/>
-            <a:r>
-              <a:rPr lang="en-US" dirty="0"/>
-              <a:t>Implemented using Python (NumPy) and C++</a:t>
-            </a:r>
-          </a:p>
-          <a:p>
-            <a:r>
-              <a:rPr lang="en-US" dirty="0"/>
-              <a:t>ML: scripts for training, test, models, etc.</a:t>
-            </a:r>
-          </a:p>
-          <a:p>
-            <a:pPr lvl="1"/>
-            <a:r>
-              <a:rPr lang="en-US" dirty="0"/>
-              <a:t>Implemented using </a:t>
-            </a:r>
-            <a:r>
-              <a:rPr lang="en-US" dirty="0" err="1"/>
-              <a:t>PyTorch</a:t>
-            </a:r>
-            <a:endParaRPr lang="en-US" dirty="0"/>
-          </a:p>
-          <a:p>
-            <a:r>
-              <a:rPr lang="en-US" dirty="0"/>
-              <a:t>CFG: configuration files for datasets</a:t>
-            </a:r>
-          </a:p>
-          <a:p>
-            <a:r>
-              <a:rPr lang="en-US" dirty="0"/>
-              <a:t>Tutorials: descriptive instructions and </a:t>
-            </a:r>
-            <a:br>
-              <a:rPr lang="en-US" dirty="0"/>
-            </a:br>
-            <a:r>
-              <a:rPr lang="en-US" dirty="0"/>
-              <a:t>documents</a:t>
-            </a:r>
-          </a:p>
-          <a:p>
-            <a:r>
-              <a:rPr lang="en-US" dirty="0"/>
-              <a:t>DA: data analysis scripts</a:t>
-            </a:r>
-          </a:p>
-        </p:txBody>
-      </p:sp>
-      <p:sp>
-        <p:nvSpPr>
-          <p:cNvPr id="4" name="Slide Number Placeholder 3">
-            <a:extLst>
-              <a:ext uri="{FF2B5EF4-FFF2-40B4-BE49-F238E27FC236}">
-                <a16:creationId xmlns:a16="http://schemas.microsoft.com/office/drawing/2014/main" id="{1E8D5409-7E14-C139-0D73-EBF3913E19C2}"/>
-              </a:ext>
-            </a:extLst>
-          </p:cNvPr>
-          <p:cNvSpPr>
-            <a:spLocks noGrp="1"/>
-          </p:cNvSpPr>
-          <p:nvPr>
-            <p:ph type="sldNum" sz="quarter" idx="4"/>
-          </p:nvPr>
-        </p:nvSpPr>
-        <p:spPr/>
-        <p:txBody>
-          <a:bodyPr/>
-          <a:lstStyle/>
-          <a:p>
-            <a:fld id="{933A556B-7C63-244D-9B7C-B0EA8042B330}" type="slidenum">
-              <a:rPr lang="en-US" smtClean="0"/>
-              <a:pPr/>
-              <a:t>21</a:t>
+              <a:t>23</a:t>
             </a:fld>
             <a:endParaRPr lang="en-US" sz="1000" dirty="0"/>
           </a:p>
@@ -8821,7 +9453,7 @@
 </p:sld>
 </file>
 
-<file path=ppt/slides/slide22.xml><?xml version="1.0" encoding="utf-8"?>
+<file path=ppt/slides/slide24.xml><?xml version="1.0" encoding="utf-8"?>
 <p:sld xmlns:a="http://schemas.openxmlformats.org/drawingml/2006/main" xmlns:r="http://schemas.openxmlformats.org/officeDocument/2006/relationships" xmlns:p="http://schemas.openxmlformats.org/presentationml/2006/main">
   <p:cSld>
     <p:spTree>
@@ -8976,7 +9608,7 @@
             <a:fld id="{933A556B-7C63-244D-9B7C-B0EA8042B330}" type="slidenum">
               <a:rPr lang="en-US" smtClean="0"/>
               <a:pPr/>
-              <a:t>22</a:t>
+              <a:t>24</a:t>
             </a:fld>
             <a:endParaRPr lang="en-US" sz="1000" dirty="0"/>
           </a:p>
@@ -9025,7 +9657,7 @@
 </p:sld>
 </file>
 
-<file path=ppt/slides/slide23.xml><?xml version="1.0" encoding="utf-8"?>
+<file path=ppt/slides/slide25.xml><?xml version="1.0" encoding="utf-8"?>
 <p:sld xmlns:a="http://schemas.openxmlformats.org/drawingml/2006/main" xmlns:r="http://schemas.openxmlformats.org/officeDocument/2006/relationships" xmlns:p="http://schemas.openxmlformats.org/presentationml/2006/main">
   <p:cSld>
     <p:spTree>
@@ -9091,7 +9723,68 @@
           <a:bodyPr/>
           <a:lstStyle/>
           <a:p>
-            <a:endParaRPr lang="en-US"/>
+            <a:r>
+              <a:rPr lang="en-US" dirty="0"/>
+              <a:t>gem5 trace processing</a:t>
+            </a:r>
+          </a:p>
+          <a:p>
+            <a:pPr lvl="1"/>
+            <a:r>
+              <a:rPr lang="en-US" dirty="0"/>
+              <a:t>0_buildInstFeature.cpp: numerical instruction feature generation</a:t>
+            </a:r>
+          </a:p>
+          <a:p>
+            <a:pPr lvl="1"/>
+            <a:r>
+              <a:rPr lang="en-US" dirty="0"/>
+              <a:t>inst2mmap.py, trace2nmmap.py: convert a textual numerical trace to </a:t>
+            </a:r>
+            <a:r>
+              <a:rPr lang="en-US" dirty="0" err="1"/>
+              <a:t>numpy</a:t>
+            </a:r>
+            <a:r>
+              <a:rPr lang="en-US" dirty="0"/>
+              <a:t> memory mapping format for </a:t>
+            </a:r>
+            <a:r>
+              <a:rPr lang="en-US" dirty="0" err="1"/>
+              <a:t>PyTorch</a:t>
+            </a:r>
+            <a:r>
+              <a:rPr lang="en-US" dirty="0"/>
+              <a:t> input</a:t>
+            </a:r>
+          </a:p>
+          <a:p>
+            <a:pPr lvl="1"/>
+            <a:r>
+              <a:rPr lang="en-US" dirty="0"/>
+              <a:t>normalize_*.</a:t>
+            </a:r>
+            <a:r>
+              <a:rPr lang="en-US" dirty="0" err="1"/>
+              <a:t>py</a:t>
+            </a:r>
+            <a:r>
+              <a:rPr lang="en-US" dirty="0"/>
+              <a:t>: dataset normalization</a:t>
+            </a:r>
+          </a:p>
+          <a:p>
+            <a:r>
+              <a:rPr lang="en-US" dirty="0"/>
+              <a:t>Training/test data generation</a:t>
+            </a:r>
+          </a:p>
+          <a:p>
+            <a:pPr lvl="1"/>
+            <a:r>
+              <a:rPr lang="en-US" dirty="0"/>
+              <a:t>0_buildComOut.cpp, combine_out.py: generate prediction labels</a:t>
+            </a:r>
           </a:p>
         </p:txBody>
       </p:sp>
@@ -9119,7 +9812,7 @@
             <a:fld id="{933A556B-7C63-244D-9B7C-B0EA8042B330}" type="slidenum">
               <a:rPr lang="en-US" smtClean="0"/>
               <a:pPr/>
-              <a:t>23</a:t>
+              <a:t>25</a:t>
             </a:fld>
             <a:endParaRPr lang="en-US" sz="1000" dirty="0"/>
           </a:p>
@@ -9168,7 +9861,7 @@
 </p:sld>
 </file>
 
-<file path=ppt/slides/slide24.xml><?xml version="1.0" encoding="utf-8"?>
+<file path=ppt/slides/slide26.xml><?xml version="1.0" encoding="utf-8"?>
 <p:sld xmlns:a="http://schemas.openxmlformats.org/drawingml/2006/main" xmlns:r="http://schemas.openxmlformats.org/officeDocument/2006/relationships" xmlns:p="http://schemas.openxmlformats.org/presentationml/2006/main">
   <p:cSld>
     <p:spTree>
@@ -9209,7 +9902,7 @@
             <a:fld id="{933A556B-7C63-244D-9B7C-B0EA8042B330}" type="slidenum">
               <a:rPr lang="en-US" smtClean="0"/>
               <a:pPr/>
-              <a:t>24</a:t>
+              <a:t>26</a:t>
             </a:fld>
             <a:endParaRPr lang="en-US" sz="1000" dirty="0"/>
           </a:p>

</xml_diff>